<commit_message>
Added Redis scoreboard example code Added use-cases to the ppt
</commit_message>
<xml_diff>
--- a/other/Redis.pptx
+++ b/other/Redis.pptx
@@ -279,7 +279,7 @@
               <a:pPr>
                 <a:defRPr/>
               </a:pPr>
-              <a:t>19-2-2015</a:t>
+              <a:t>21-2-2015</a:t>
             </a:fld>
             <a:endParaRPr lang="nl-NL"/>
           </a:p>
@@ -7070,7 +7070,108 @@
           <a:bodyPr/>
           <a:lstStyle/>
           <a:p>
-            <a:endParaRPr lang="nl-BE"/>
+            <a:r>
+              <a:rPr lang="nl-BE" dirty="0" smtClean="0"/>
+              <a:t>In-memory cache</a:t>
+            </a:r>
+          </a:p>
+          <a:p>
+            <a:r>
+              <a:rPr lang="nl-BE" dirty="0" smtClean="0"/>
+              <a:t>Leaderboard</a:t>
+            </a:r>
+          </a:p>
+          <a:p>
+            <a:r>
+              <a:rPr lang="nl-BE" dirty="0" smtClean="0"/>
+              <a:t>Pinterest</a:t>
+            </a:r>
+          </a:p>
+          <a:p>
+            <a:pPr lvl="1"/>
+            <a:r>
+              <a:rPr lang="nl-BE" dirty="0">
+                <a:hlinkClick r:id="rId2"/>
+              </a:rPr>
+              <a:t>http://</a:t>
+            </a:r>
+            <a:r>
+              <a:rPr lang="nl-BE" dirty="0" smtClean="0">
+                <a:hlinkClick r:id="rId2"/>
+              </a:rPr>
+              <a:t>blog.pivotal.io/pivotal/case-studies-2/using-redis-at-pinterest-for-billions-of-relationships</a:t>
+            </a:r>
+            <a:endParaRPr lang="nl-BE" dirty="0" smtClean="0"/>
+          </a:p>
+          <a:p>
+            <a:r>
+              <a:rPr lang="nl-BE" dirty="0" smtClean="0"/>
+              <a:t>Twitter</a:t>
+            </a:r>
+          </a:p>
+          <a:p>
+            <a:pPr lvl="1"/>
+            <a:r>
+              <a:rPr lang="nl-BE" dirty="0">
+                <a:hlinkClick r:id="rId3"/>
+              </a:rPr>
+              <a:t>http://</a:t>
+            </a:r>
+            <a:r>
+              <a:rPr lang="nl-BE" dirty="0" smtClean="0">
+                <a:hlinkClick r:id="rId3"/>
+              </a:rPr>
+              <a:t>blog.pivotal.io/pivotal/case-studies-2/case-study-staple-yourself-to-a-tweet-to-understand-30-billion-redis-updates-per-day</a:t>
+            </a:r>
+            <a:endParaRPr lang="nl-BE" dirty="0" smtClean="0"/>
+          </a:p>
+          <a:p>
+            <a:r>
+              <a:rPr lang="nl-BE" dirty="0" smtClean="0"/>
+              <a:t>Viacom</a:t>
+            </a:r>
+          </a:p>
+          <a:p>
+            <a:pPr lvl="1"/>
+            <a:r>
+              <a:rPr lang="nl-BE" dirty="0">
+                <a:hlinkClick r:id="rId4"/>
+              </a:rPr>
+              <a:t>http://</a:t>
+            </a:r>
+            <a:r>
+              <a:rPr lang="nl-BE" dirty="0" smtClean="0">
+                <a:hlinkClick r:id="rId4"/>
+              </a:rPr>
+              <a:t>blog.pivotal.io/pivotal/case-studies-2/8-ways-media-giant-viacom-uses-redis-to-serve-dynamic-video-at-scale</a:t>
+            </a:r>
+            <a:endParaRPr lang="nl-BE" dirty="0" smtClean="0"/>
+          </a:p>
+          <a:p>
+            <a:r>
+              <a:rPr lang="nl-BE" dirty="0" smtClean="0"/>
+              <a:t>Superfeedr</a:t>
+            </a:r>
+          </a:p>
+          <a:p>
+            <a:pPr lvl="1"/>
+            <a:r>
+              <a:rPr lang="nl-BE" dirty="0">
+                <a:hlinkClick r:id="rId5"/>
+              </a:rPr>
+              <a:t>http://</a:t>
+            </a:r>
+            <a:r>
+              <a:rPr lang="nl-BE" dirty="0" smtClean="0">
+                <a:hlinkClick r:id="rId5"/>
+              </a:rPr>
+              <a:t>blog.pivotal.io/pivotal/case-studies-2/22-billion-served-julien-genestoux-of-superfeedr</a:t>
+            </a:r>
+            <a:endParaRPr lang="nl-BE" dirty="0" smtClean="0"/>
+          </a:p>
+          <a:p>
+            <a:pPr lvl="1"/>
+            <a:endParaRPr lang="nl-BE" dirty="0"/>
           </a:p>
         </p:txBody>
       </p:sp>
@@ -13715,6 +13816,23 @@
 </file>
 
 <file path=customXml/item1.xml><?xml version="1.0" encoding="utf-8"?>
+<p:properties xmlns:p="http://schemas.microsoft.com/office/2006/metadata/properties" xmlns:xsi="http://www.w3.org/2001/XMLSchema-instance">
+  <documentManagement>
+    <Category xmlns="9947e74f-0c74-4337-8298-46b4ff49fe7f">Templates</Category>
+  </documentManagement>
+</p:properties>
+</file>
+
+<file path=customXml/item2.xml><?xml version="1.0" encoding="utf-8"?>
+<?mso-contentType ?>
+<FormTemplates xmlns="http://schemas.microsoft.com/sharepoint/v3/contenttype/forms">
+  <Display>DocumentLibraryForm</Display>
+  <Edit>DocumentLibraryForm</Edit>
+  <New>DocumentLibraryForm</New>
+</FormTemplates>
+</file>
+
+<file path=customXml/item3.xml><?xml version="1.0" encoding="utf-8"?>
 <ct:contentTypeSchema xmlns:ct="http://schemas.microsoft.com/office/2006/metadata/contentType" xmlns:ma="http://schemas.microsoft.com/office/2006/metadata/properties/metaAttributes" ct:_="" ma:_="" ma:contentTypeName="Document" ma:contentTypeID="0x010100708BA29B4CF45A4E9096EE85E335500E" ma:contentTypeVersion="1" ma:contentTypeDescription="Create a new document." ma:contentTypeScope="" ma:versionID="e77cc56981c8faf257dc8855c0ad3e85">
   <xsd:schema xmlns:xsd="http://www.w3.org/2001/XMLSchema" xmlns:xs="http://www.w3.org/2001/XMLSchema" xmlns:p="http://schemas.microsoft.com/office/2006/metadata/properties" xmlns:ns2="9947e74f-0c74-4337-8298-46b4ff49fe7f" targetNamespace="http://schemas.microsoft.com/office/2006/metadata/properties" ma:root="true" ma:fieldsID="5b9cf7dcc2c3005e41cdc85731940b62" ns2:_="">
     <xsd:import namespace="9947e74f-0c74-4337-8298-46b4ff49fe7f"/>
@@ -13846,24 +13964,31 @@
 </ct:contentTypeSchema>
 </file>
 
-<file path=customXml/item2.xml><?xml version="1.0" encoding="utf-8"?>
-<?mso-contentType ?>
-<FormTemplates xmlns="http://schemas.microsoft.com/sharepoint/v3/contenttype/forms">
-  <Display>DocumentLibraryForm</Display>
-  <Edit>DocumentLibraryForm</Edit>
-  <New>DocumentLibraryForm</New>
-</FormTemplates>
+<file path=customXml/itemProps1.xml><?xml version="1.0" encoding="utf-8"?>
+<ds:datastoreItem xmlns:ds="http://schemas.openxmlformats.org/officeDocument/2006/customXml" ds:itemID="{11E8D46A-5B1E-48CA-9945-2F9446ADA624}">
+  <ds:schemaRefs>
+    <ds:schemaRef ds:uri="http://schemas.microsoft.com/office/2006/documentManagement/types"/>
+    <ds:schemaRef ds:uri="http://purl.org/dc/dcmitype/"/>
+    <ds:schemaRef ds:uri="http://www.w3.org/XML/1998/namespace"/>
+    <ds:schemaRef ds:uri="http://purl.org/dc/elements/1.1/"/>
+    <ds:schemaRef ds:uri="http://schemas.openxmlformats.org/package/2006/metadata/core-properties"/>
+    <ds:schemaRef ds:uri="http://schemas.microsoft.com/office/infopath/2007/PartnerControls"/>
+    <ds:schemaRef ds:uri="9947e74f-0c74-4337-8298-46b4ff49fe7f"/>
+    <ds:schemaRef ds:uri="http://schemas.microsoft.com/office/2006/metadata/properties"/>
+    <ds:schemaRef ds:uri="http://purl.org/dc/terms/"/>
+  </ds:schemaRefs>
+</ds:datastoreItem>
 </file>
 
-<file path=customXml/item3.xml><?xml version="1.0" encoding="utf-8"?>
-<p:properties xmlns:p="http://schemas.microsoft.com/office/2006/metadata/properties" xmlns:xsi="http://www.w3.org/2001/XMLSchema-instance">
-  <documentManagement>
-    <Category xmlns="9947e74f-0c74-4337-8298-46b4ff49fe7f">Templates</Category>
-  </documentManagement>
-</p:properties>
+<file path=customXml/itemProps2.xml><?xml version="1.0" encoding="utf-8"?>
+<ds:datastoreItem xmlns:ds="http://schemas.openxmlformats.org/officeDocument/2006/customXml" ds:itemID="{AC380432-8BA5-4796-AADD-1C55273BAA62}">
+  <ds:schemaRefs>
+    <ds:schemaRef ds:uri="http://schemas.microsoft.com/sharepoint/v3/contenttype/forms"/>
+  </ds:schemaRefs>
+</ds:datastoreItem>
 </file>
 
-<file path=customXml/itemProps1.xml><?xml version="1.0" encoding="utf-8"?>
+<file path=customXml/itemProps3.xml><?xml version="1.0" encoding="utf-8"?>
 <ds:datastoreItem xmlns:ds="http://schemas.openxmlformats.org/officeDocument/2006/customXml" ds:itemID="{C2E89B77-E8CD-4A4B-B0D0-984D89C52B4D}">
   <ds:schemaRefs>
     <ds:schemaRef ds:uri="http://schemas.microsoft.com/office/2006/metadata/contentType"/>
@@ -13879,28 +14004,4 @@
     <ds:schemaRef ds:uri="http://schemas.microsoft.com/internal/obd"/>
   </ds:schemaRefs>
 </ds:datastoreItem>
-</file>
-
-<file path=customXml/itemProps2.xml><?xml version="1.0" encoding="utf-8"?>
-<ds:datastoreItem xmlns:ds="http://schemas.openxmlformats.org/officeDocument/2006/customXml" ds:itemID="{AC380432-8BA5-4796-AADD-1C55273BAA62}">
-  <ds:schemaRefs>
-    <ds:schemaRef ds:uri="http://schemas.microsoft.com/sharepoint/v3/contenttype/forms"/>
-  </ds:schemaRefs>
-</ds:datastoreItem>
-</file>
-
-<file path=customXml/itemProps3.xml><?xml version="1.0" encoding="utf-8"?>
-<ds:datastoreItem xmlns:ds="http://schemas.openxmlformats.org/officeDocument/2006/customXml" ds:itemID="{11E8D46A-5B1E-48CA-9945-2F9446ADA624}">
-  <ds:schemaRefs>
-    <ds:schemaRef ds:uri="http://schemas.microsoft.com/office/2006/documentManagement/types"/>
-    <ds:schemaRef ds:uri="http://purl.org/dc/dcmitype/"/>
-    <ds:schemaRef ds:uri="http://www.w3.org/XML/1998/namespace"/>
-    <ds:schemaRef ds:uri="http://purl.org/dc/elements/1.1/"/>
-    <ds:schemaRef ds:uri="http://schemas.openxmlformats.org/package/2006/metadata/core-properties"/>
-    <ds:schemaRef ds:uri="http://schemas.microsoft.com/office/infopath/2007/PartnerControls"/>
-    <ds:schemaRef ds:uri="9947e74f-0c74-4337-8298-46b4ff49fe7f"/>
-    <ds:schemaRef ds:uri="http://schemas.microsoft.com/office/2006/metadata/properties"/>
-    <ds:schemaRef ds:uri="http://purl.org/dc/terms/"/>
-  </ds:schemaRefs>
-</ds:datastoreItem>
 </file>
</xml_diff>

<commit_message>
added usecase to presentation
</commit_message>
<xml_diff>
--- a/other/Redis.pptx
+++ b/other/Redis.pptx
@@ -5,10 +5,10 @@
     <p:sldMasterId id="2147483648" r:id="rId4"/>
   </p:sldMasterIdLst>
   <p:notesMasterIdLst>
-    <p:notesMasterId r:id="rId16"/>
+    <p:notesMasterId r:id="rId17"/>
   </p:notesMasterIdLst>
   <p:handoutMasterIdLst>
-    <p:handoutMasterId r:id="rId17"/>
+    <p:handoutMasterId r:id="rId18"/>
   </p:handoutMasterIdLst>
   <p:sldIdLst>
     <p:sldId id="256" r:id="rId5"/>
@@ -22,6 +22,7 @@
     <p:sldId id="265" r:id="rId13"/>
     <p:sldId id="264" r:id="rId14"/>
     <p:sldId id="266" r:id="rId15"/>
+    <p:sldId id="267" r:id="rId16"/>
   </p:sldIdLst>
   <p:sldSz cx="9144000" cy="6858000" type="screen4x3"/>
   <p:notesSz cx="6858000" cy="9144000"/>
@@ -279,7 +280,7 @@
               <a:pPr>
                 <a:defRPr/>
               </a:pPr>
-              <a:t>21-2-2015</a:t>
+              <a:t>24-2-2015</a:t>
             </a:fld>
             <a:endParaRPr lang="nl-NL"/>
           </a:p>
@@ -2262,18 +2263,6 @@
               <a:defRPr/>
             </a:pPr>
             <a:r>
-              <a:rPr lang="nl-BE" sz="1200" b="0" i="0" kern="1200" dirty="0" err="1" smtClean="0">
-                <a:solidFill>
-                  <a:srgbClr val="000000"/>
-                </a:solidFill>
-                <a:effectLst/>
-                <a:latin typeface="Times New Roman" pitchFamily="16" charset="0"/>
-                <a:ea typeface="+mn-ea"/>
-                <a:cs typeface="+mn-cs"/>
-              </a:rPr>
-              <a:t>Very</a:t>
-            </a:r>
-            <a:r>
               <a:rPr lang="nl-BE" sz="1200" b="0" i="0" kern="1200" dirty="0" smtClean="0">
                 <a:solidFill>
                   <a:srgbClr val="000000"/>
@@ -2283,65 +2272,8 @@
                 <a:ea typeface="+mn-ea"/>
                 <a:cs typeface="+mn-cs"/>
               </a:rPr>
-              <a:t> </a:t>
-            </a:r>
-            <a:r>
-              <a:rPr lang="nl-BE" sz="1200" b="0" i="0" kern="1200" dirty="0" err="1" smtClean="0">
-                <a:solidFill>
-                  <a:srgbClr val="000000"/>
-                </a:solidFill>
-                <a:effectLst/>
-                <a:latin typeface="Times New Roman" pitchFamily="16" charset="0"/>
-                <a:ea typeface="+mn-ea"/>
-                <a:cs typeface="+mn-cs"/>
-              </a:rPr>
-              <a:t>fast</a:t>
-            </a:r>
-            <a:r>
-              <a:rPr lang="nl-BE" sz="1200" b="0" i="0" kern="1200" dirty="0" smtClean="0">
-                <a:solidFill>
-                  <a:srgbClr val="000000"/>
-                </a:solidFill>
-                <a:effectLst/>
-                <a:latin typeface="Times New Roman" pitchFamily="16" charset="0"/>
-                <a:ea typeface="+mn-ea"/>
-                <a:cs typeface="+mn-cs"/>
-              </a:rPr>
-              <a:t> operations on </a:t>
-            </a:r>
-            <a:r>
-              <a:rPr lang="nl-BE" sz="1200" b="0" i="0" kern="1200" dirty="0" err="1" smtClean="0">
-                <a:solidFill>
-                  <a:srgbClr val="000000"/>
-                </a:solidFill>
-                <a:effectLst/>
-                <a:latin typeface="Times New Roman" pitchFamily="16" charset="0"/>
-                <a:ea typeface="+mn-ea"/>
-                <a:cs typeface="+mn-cs"/>
-              </a:rPr>
-              <a:t>supported</a:t>
-            </a:r>
-            <a:r>
-              <a:rPr lang="nl-BE" sz="1200" b="0" i="0" kern="1200" smtClean="0">
-                <a:solidFill>
-                  <a:srgbClr val="000000"/>
-                </a:solidFill>
-                <a:effectLst/>
-                <a:latin typeface="Times New Roman" pitchFamily="16" charset="0"/>
-                <a:ea typeface="+mn-ea"/>
-                <a:cs typeface="+mn-cs"/>
-              </a:rPr>
-              <a:t> data types.</a:t>
-            </a:r>
-            <a:endParaRPr lang="nl-BE" sz="1200" b="0" i="0" kern="1200" dirty="0" smtClean="0">
-              <a:solidFill>
-                <a:srgbClr val="000000"/>
-              </a:solidFill>
-              <a:effectLst/>
-              <a:latin typeface="Times New Roman" pitchFamily="16" charset="0"/>
-              <a:ea typeface="+mn-ea"/>
-              <a:cs typeface="+mn-cs"/>
-            </a:endParaRPr>
+              <a:t>Very fast operations on supported data types.</a:t>
+            </a:r>
           </a:p>
         </p:txBody>
       </p:sp>
@@ -2378,6 +2310,106 @@
     <p:extLst>
       <p:ext uri="{BB962C8B-B14F-4D97-AF65-F5344CB8AC3E}">
         <p14:creationId xmlns:p14="http://schemas.microsoft.com/office/powerpoint/2010/main" val="1019723802"/>
+      </p:ext>
+    </p:extLst>
+  </p:cSld>
+  <p:clrMapOvr>
+    <a:masterClrMapping/>
+  </p:clrMapOvr>
+</p:notes>
+</file>
+
+<file path=ppt/notesSlides/notesSlide7.xml><?xml version="1.0" encoding="utf-8"?>
+<p:notes xmlns:a="http://schemas.openxmlformats.org/drawingml/2006/main" xmlns:r="http://schemas.openxmlformats.org/officeDocument/2006/relationships" xmlns:p="http://schemas.openxmlformats.org/presentationml/2006/main">
+  <p:cSld>
+    <p:spTree>
+      <p:nvGrpSpPr>
+        <p:cNvPr id="1" name=""/>
+        <p:cNvGrpSpPr/>
+        <p:nvPr/>
+      </p:nvGrpSpPr>
+      <p:grpSpPr>
+        <a:xfrm>
+          <a:off x="0" y="0"/>
+          <a:ext cx="0" cy="0"/>
+          <a:chOff x="0" y="0"/>
+          <a:chExt cx="0" cy="0"/>
+        </a:xfrm>
+      </p:grpSpPr>
+      <p:sp>
+        <p:nvSpPr>
+          <p:cNvPr id="2" name="Slide Image Placeholder 1"/>
+          <p:cNvSpPr>
+            <a:spLocks noGrp="1" noRot="1" noChangeAspect="1"/>
+          </p:cNvSpPr>
+          <p:nvPr>
+            <p:ph type="sldImg"/>
+          </p:nvPr>
+        </p:nvSpPr>
+        <p:spPr/>
+      </p:sp>
+      <p:sp>
+        <p:nvSpPr>
+          <p:cNvPr id="3" name="Notes Placeholder 2"/>
+          <p:cNvSpPr>
+            <a:spLocks noGrp="1"/>
+          </p:cNvSpPr>
+          <p:nvPr>
+            <p:ph type="body" idx="1"/>
+          </p:nvPr>
+        </p:nvSpPr>
+        <p:spPr/>
+        <p:txBody>
+          <a:bodyPr/>
+          <a:lstStyle/>
+          <a:p>
+            <a:r>
+              <a:rPr lang="nl-BE" dirty="0" smtClean="0"/>
+              <a:t>MORE:</a:t>
+            </a:r>
+          </a:p>
+          <a:p>
+            <a:r>
+              <a:rPr lang="en-US" smtClean="0"/>
+              <a:t>http://blog.pivotal.io/pivotal/case-studies-2/case-study-how-hulu-scaled-serving-4-billion-videos-using-redis</a:t>
+            </a:r>
+            <a:endParaRPr lang="en-US"/>
+          </a:p>
+        </p:txBody>
+      </p:sp>
+      <p:sp>
+        <p:nvSpPr>
+          <p:cNvPr id="4" name="Slide Number Placeholder 3"/>
+          <p:cNvSpPr>
+            <a:spLocks noGrp="1"/>
+          </p:cNvSpPr>
+          <p:nvPr>
+            <p:ph type="sldNum" idx="10"/>
+          </p:nvPr>
+        </p:nvSpPr>
+        <p:spPr/>
+        <p:txBody>
+          <a:bodyPr/>
+          <a:lstStyle/>
+          <a:p>
+            <a:pPr>
+              <a:defRPr/>
+            </a:pPr>
+            <a:fld id="{207F4200-82FD-4511-817F-06FB427217E6}" type="slidenum">
+              <a:rPr lang="nl-NL" smtClean="0"/>
+              <a:pPr>
+                <a:defRPr/>
+              </a:pPr>
+              <a:t>11</a:t>
+            </a:fld>
+            <a:endParaRPr lang="nl-NL"/>
+          </a:p>
+        </p:txBody>
+      </p:sp>
+    </p:spTree>
+    <p:extLst>
+      <p:ext uri="{BB962C8B-B14F-4D97-AF65-F5344CB8AC3E}">
+        <p14:creationId xmlns:p14="http://schemas.microsoft.com/office/powerpoint/2010/main" val="820401157"/>
       </p:ext>
     </p:extLst>
   </p:cSld>
@@ -7091,28 +7123,6 @@
             <a:pPr lvl="1"/>
             <a:r>
               <a:rPr lang="nl-BE" dirty="0">
-                <a:hlinkClick r:id="rId2"/>
-              </a:rPr>
-              <a:t>http://</a:t>
-            </a:r>
-            <a:r>
-              <a:rPr lang="nl-BE" dirty="0" smtClean="0">
-                <a:hlinkClick r:id="rId2"/>
-              </a:rPr>
-              <a:t>blog.pivotal.io/pivotal/case-studies-2/using-redis-at-pinterest-for-billions-of-relationships</a:t>
-            </a:r>
-            <a:endParaRPr lang="nl-BE" dirty="0" smtClean="0"/>
-          </a:p>
-          <a:p>
-            <a:r>
-              <a:rPr lang="nl-BE" dirty="0" smtClean="0"/>
-              <a:t>Twitter</a:t>
-            </a:r>
-          </a:p>
-          <a:p>
-            <a:pPr lvl="1"/>
-            <a:r>
-              <a:rPr lang="nl-BE" dirty="0">
                 <a:hlinkClick r:id="rId3"/>
               </a:rPr>
               <a:t>http://</a:t>
@@ -7121,14 +7131,14 @@
               <a:rPr lang="nl-BE" dirty="0" smtClean="0">
                 <a:hlinkClick r:id="rId3"/>
               </a:rPr>
-              <a:t>blog.pivotal.io/pivotal/case-studies-2/case-study-staple-yourself-to-a-tweet-to-understand-30-billion-redis-updates-per-day</a:t>
+              <a:t>blog.pivotal.io/pivotal/case-studies-2/using-redis-at-pinterest-for-billions-of-relationships</a:t>
             </a:r>
             <a:endParaRPr lang="nl-BE" dirty="0" smtClean="0"/>
           </a:p>
           <a:p>
             <a:r>
               <a:rPr lang="nl-BE" dirty="0" smtClean="0"/>
-              <a:t>Viacom</a:t>
+              <a:t>Twitter</a:t>
             </a:r>
           </a:p>
           <a:p>
@@ -7143,14 +7153,14 @@
               <a:rPr lang="nl-BE" dirty="0" smtClean="0">
                 <a:hlinkClick r:id="rId4"/>
               </a:rPr>
-              <a:t>blog.pivotal.io/pivotal/case-studies-2/8-ways-media-giant-viacom-uses-redis-to-serve-dynamic-video-at-scale</a:t>
+              <a:t>blog.pivotal.io/pivotal/case-studies-2/case-study-staple-yourself-to-a-tweet-to-understand-30-billion-redis-updates-per-day</a:t>
             </a:r>
             <a:endParaRPr lang="nl-BE" dirty="0" smtClean="0"/>
           </a:p>
           <a:p>
             <a:r>
               <a:rPr lang="nl-BE" dirty="0" smtClean="0"/>
-              <a:t>Superfeedr</a:t>
+              <a:t>Viacom</a:t>
             </a:r>
           </a:p>
           <a:p>
@@ -7164,6 +7174,28 @@
             <a:r>
               <a:rPr lang="nl-BE" dirty="0" smtClean="0">
                 <a:hlinkClick r:id="rId5"/>
+              </a:rPr>
+              <a:t>blog.pivotal.io/pivotal/case-studies-2/8-ways-media-giant-viacom-uses-redis-to-serve-dynamic-video-at-scale</a:t>
+            </a:r>
+            <a:endParaRPr lang="nl-BE" dirty="0" smtClean="0"/>
+          </a:p>
+          <a:p>
+            <a:r>
+              <a:rPr lang="nl-BE" dirty="0" smtClean="0"/>
+              <a:t>Superfeedr</a:t>
+            </a:r>
+          </a:p>
+          <a:p>
+            <a:pPr lvl="1"/>
+            <a:r>
+              <a:rPr lang="nl-BE" dirty="0">
+                <a:hlinkClick r:id="rId6"/>
+              </a:rPr>
+              <a:t>http://</a:t>
+            </a:r>
+            <a:r>
+              <a:rPr lang="nl-BE" dirty="0" smtClean="0">
+                <a:hlinkClick r:id="rId6"/>
               </a:rPr>
               <a:t>blog.pivotal.io/pivotal/case-studies-2/22-billion-served-julien-genestoux-of-superfeedr</a:t>
             </a:r>
@@ -7188,6 +7220,127 @@
   <p:transition>
     <p:fade/>
   </p:transition>
+  <p:timing>
+    <p:tnLst>
+      <p:par>
+        <p:cTn id="1" dur="indefinite" restart="never" nodeType="tmRoot"/>
+      </p:par>
+    </p:tnLst>
+  </p:timing>
+</p:sld>
+</file>
+
+<file path=ppt/slides/slide12.xml><?xml version="1.0" encoding="utf-8"?>
+<p:sld xmlns:a="http://schemas.openxmlformats.org/drawingml/2006/main" xmlns:r="http://schemas.openxmlformats.org/officeDocument/2006/relationships" xmlns:p="http://schemas.openxmlformats.org/presentationml/2006/main">
+  <p:cSld>
+    <p:spTree>
+      <p:nvGrpSpPr>
+        <p:cNvPr id="1" name=""/>
+        <p:cNvGrpSpPr/>
+        <p:nvPr/>
+      </p:nvGrpSpPr>
+      <p:grpSpPr>
+        <a:xfrm>
+          <a:off x="0" y="0"/>
+          <a:ext cx="0" cy="0"/>
+          <a:chOff x="0" y="0"/>
+          <a:chExt cx="0" cy="0"/>
+        </a:xfrm>
+      </p:grpSpPr>
+      <p:sp>
+        <p:nvSpPr>
+          <p:cNvPr id="5" name="Title 4"/>
+          <p:cNvSpPr>
+            <a:spLocks noGrp="1"/>
+          </p:cNvSpPr>
+          <p:nvPr>
+            <p:ph type="ctrTitle"/>
+          </p:nvPr>
+        </p:nvSpPr>
+        <p:spPr>
+          <a:xfrm>
+            <a:off x="1331640" y="3933056"/>
+            <a:ext cx="6559051" cy="1143008"/>
+          </a:xfrm>
+        </p:spPr>
+        <p:txBody>
+          <a:bodyPr/>
+          <a:lstStyle/>
+          <a:p>
+            <a:pPr algn="ctr"/>
+            <a:r>
+              <a:rPr lang="en-US" dirty="0" smtClean="0"/>
+              <a:t>Demo</a:t>
+            </a:r>
+            <a:endParaRPr lang="en-US" dirty="0"/>
+          </a:p>
+        </p:txBody>
+      </p:sp>
+      <p:pic>
+        <p:nvPicPr>
+          <p:cNvPr id="1026" name="Picture 2" descr="http://sametmax.com/wp-content/uploads/2012/07/banner_redis-300dpi-0315a8013afee137cce47b474541d7f1.png"/>
+          <p:cNvPicPr>
+            <a:picLocks noGrp="1" noChangeAspect="1" noChangeArrowheads="1"/>
+          </p:cNvPicPr>
+          <p:nvPr>
+            <p:ph type="pic" sz="quarter" idx="10"/>
+          </p:nvPr>
+        </p:nvPicPr>
+        <p:blipFill>
+          <a:blip r:embed="rId2">
+            <a:extLst>
+              <a:ext uri="{28A0092B-C50C-407E-A947-70E740481C1C}">
+                <a14:useLocalDpi xmlns:a14="http://schemas.microsoft.com/office/drawing/2010/main" val="0"/>
+              </a:ext>
+            </a:extLst>
+          </a:blip>
+          <a:stretch>
+            <a:fillRect/>
+          </a:stretch>
+        </p:blipFill>
+        <p:spPr bwMode="auto">
+          <a:xfrm>
+            <a:off x="2788166" y="327948"/>
+            <a:ext cx="3440018" cy="2957036"/>
+          </a:xfrm>
+          <a:prstGeom prst="rect">
+            <a:avLst/>
+          </a:prstGeom>
+          <a:noFill/>
+          <a:ln>
+            <a:noFill/>
+          </a:ln>
+          <a:extLst>
+            <a:ext uri="{909E8E84-426E-40DD-AFC4-6F175D3DCCD1}">
+              <a14:hiddenFill xmlns:a14="http://schemas.microsoft.com/office/drawing/2010/main">
+                <a:solidFill>
+                  <a:srgbClr val="FFFFFF"/>
+                </a:solidFill>
+              </a14:hiddenFill>
+            </a:ext>
+          </a:extLst>
+        </p:spPr>
+      </p:pic>
+    </p:spTree>
+    <p:extLst>
+      <p:ext uri="{BB962C8B-B14F-4D97-AF65-F5344CB8AC3E}">
+        <p14:creationId xmlns:p14="http://schemas.microsoft.com/office/powerpoint/2010/main" val="220116679"/>
+      </p:ext>
+    </p:extLst>
+  </p:cSld>
+  <p:clrMapOvr>
+    <a:masterClrMapping/>
+  </p:clrMapOvr>
+  <p:transition>
+    <p:fade/>
+  </p:transition>
+  <p:timing>
+    <p:tnLst>
+      <p:par>
+        <p:cTn id="1" dur="indefinite" restart="never" nodeType="tmRoot"/>
+      </p:par>
+    </p:tnLst>
+  </p:timing>
 </p:sld>
 </file>
 
@@ -8370,12 +8523,12 @@
           </a:p>
           <a:p>
             <a:r>
-              <a:rPr lang="nl-BE" dirty="0" err="1" smtClean="0"/>
-              <a:t>Tokoy</a:t>
-            </a:r>
-            <a:r>
               <a:rPr lang="nl-BE" dirty="0" smtClean="0"/>
-              <a:t> Cabinet</a:t>
+              <a:t>Tokyo </a:t>
+            </a:r>
+            <a:r>
+              <a:rPr lang="nl-BE" dirty="0" smtClean="0"/>
+              <a:t>Cabinet</a:t>
             </a:r>
           </a:p>
           <a:p>
@@ -8391,8 +8544,8 @@
           </a:p>
           <a:p>
             <a:r>
-              <a:rPr lang="nl-BE" dirty="0" err="1" smtClean="0"/>
-              <a:t>Hpyerdex</a:t>
+              <a:rPr lang="nl-BE" dirty="0" smtClean="0"/>
+              <a:t>Hyperdex</a:t>
             </a:r>
             <a:endParaRPr lang="nl-BE" dirty="0" smtClean="0"/>
           </a:p>

</xml_diff>